<commit_message>
Slide com Alterações necessárias
</commit_message>
<xml_diff>
--- a/LoopInfinito - Apresentação final.pptx
+++ b/LoopInfinito - Apresentação final.pptx
@@ -6378,12 +6378,12 @@
         <p:spPr>
           <a:xfrm>
             <a:off x="1749287" y="2111824"/>
-            <a:ext cx="10131425" cy="3649133"/>
+            <a:ext cx="9836255" cy="3649133"/>
           </a:xfrm>
         </p:spPr>
         <p:txBody>
           <a:bodyPr>
-            <a:normAutofit fontScale="92500" lnSpcReduction="10000"/>
+            <a:normAutofit/>
           </a:bodyPr>
           <a:lstStyle/>
           <a:p>
@@ -6392,7 +6392,7 @@
                 <a:latin typeface="Arial" panose="020B0604020202020204" pitchFamily="34" charset="0"/>
                 <a:cs typeface="Arial" panose="020B0604020202020204" pitchFamily="34" charset="0"/>
               </a:rPr>
-              <a:t>O software foi feito em Java com auxilio da IDE NetBeans, o acesso a banco de dados através de </a:t>
+              <a:t>O software foi feito em Java com auxilio da IDE NetBeans, o acesso ao banco de dados local através de </a:t>
             </a:r>
             <a:r>
               <a:rPr lang="pt-BR" dirty="0" err="1">
@@ -6406,126 +6406,7 @@
                 <a:latin typeface="Arial" panose="020B0604020202020204" pitchFamily="34" charset="0"/>
                 <a:cs typeface="Arial" panose="020B0604020202020204" pitchFamily="34" charset="0"/>
               </a:rPr>
-              <a:t> ,e utilizando os paradigmas de orientação a objetos, o sistema possui os seguintes atributos básicos para seu funcionamento:</a:t>
-            </a:r>
-          </a:p>
-          <a:p>
-            <a:r>
-              <a:rPr lang="pt-BR" dirty="0">
-                <a:latin typeface="Arial" panose="020B0604020202020204" pitchFamily="34" charset="0"/>
-                <a:cs typeface="Arial" panose="020B0604020202020204" pitchFamily="34" charset="0"/>
-              </a:rPr>
-              <a:t>Banco de dados local </a:t>
-            </a:r>
-            <a:r>
-              <a:rPr lang="pt-BR" i="1" dirty="0" err="1">
-                <a:latin typeface="Arial" panose="020B0604020202020204" pitchFamily="34" charset="0"/>
-                <a:cs typeface="Arial" panose="020B0604020202020204" pitchFamily="34" charset="0"/>
-              </a:rPr>
-              <a:t>bdlocadoraloop</a:t>
-            </a:r>
-            <a:r>
-              <a:rPr lang="pt-BR" i="1" dirty="0">
-                <a:latin typeface="Arial" panose="020B0604020202020204" pitchFamily="34" charset="0"/>
-                <a:cs typeface="Arial" panose="020B0604020202020204" pitchFamily="34" charset="0"/>
-              </a:rPr>
-              <a:t>;</a:t>
-            </a:r>
-            <a:endParaRPr lang="pt-BR" sz="2400" i="1" dirty="0">
-              <a:latin typeface="Arial" panose="020B0604020202020204" pitchFamily="34" charset="0"/>
-              <a:cs typeface="Arial" panose="020B0604020202020204" pitchFamily="34" charset="0"/>
-            </a:endParaRPr>
-          </a:p>
-          <a:p>
-            <a:r>
-              <a:rPr lang="pt-BR" dirty="0">
-                <a:latin typeface="Arial" panose="020B0604020202020204" pitchFamily="34" charset="0"/>
-                <a:cs typeface="Arial" panose="020B0604020202020204" pitchFamily="34" charset="0"/>
-              </a:rPr>
-              <a:t>Tabela </a:t>
-            </a:r>
-            <a:r>
-              <a:rPr lang="pt-BR" i="1" dirty="0" err="1">
-                <a:latin typeface="Arial" panose="020B0604020202020204" pitchFamily="34" charset="0"/>
-                <a:cs typeface="Arial" panose="020B0604020202020204" pitchFamily="34" charset="0"/>
-              </a:rPr>
-              <a:t>tbl_cliente</a:t>
-            </a:r>
-            <a:r>
-              <a:rPr lang="pt-BR" sz="2400" dirty="0">
-                <a:latin typeface="Arial" panose="020B0604020202020204" pitchFamily="34" charset="0"/>
-                <a:cs typeface="Arial" panose="020B0604020202020204" pitchFamily="34" charset="0"/>
-              </a:rPr>
-              <a:t>;</a:t>
-            </a:r>
-          </a:p>
-          <a:p>
-            <a:r>
-              <a:rPr lang="pt-BR" sz="2400" dirty="0">
-                <a:latin typeface="Arial" panose="020B0604020202020204" pitchFamily="34" charset="0"/>
-                <a:cs typeface="Arial" panose="020B0604020202020204" pitchFamily="34" charset="0"/>
-              </a:rPr>
-              <a:t>Tabela </a:t>
-            </a:r>
-            <a:r>
-              <a:rPr lang="pt-BR" sz="2400" i="1" dirty="0" err="1">
-                <a:latin typeface="Arial" panose="020B0604020202020204" pitchFamily="34" charset="0"/>
-                <a:cs typeface="Arial" panose="020B0604020202020204" pitchFamily="34" charset="0"/>
-              </a:rPr>
-              <a:t>tbl_filmes</a:t>
-            </a:r>
-            <a:r>
-              <a:rPr lang="pt-BR" sz="2400" dirty="0">
-                <a:latin typeface="Arial" panose="020B0604020202020204" pitchFamily="34" charset="0"/>
-                <a:cs typeface="Arial" panose="020B0604020202020204" pitchFamily="34" charset="0"/>
-              </a:rPr>
-              <a:t>;</a:t>
-            </a:r>
-          </a:p>
-          <a:p>
-            <a:r>
-              <a:rPr lang="pt-BR" dirty="0">
-                <a:latin typeface="Arial" panose="020B0604020202020204" pitchFamily="34" charset="0"/>
-                <a:cs typeface="Arial" panose="020B0604020202020204" pitchFamily="34" charset="0"/>
-              </a:rPr>
-              <a:t>Tabela </a:t>
-            </a:r>
-            <a:r>
-              <a:rPr lang="pt-BR" i="1" dirty="0" err="1">
-                <a:latin typeface="Arial" panose="020B0604020202020204" pitchFamily="34" charset="0"/>
-                <a:cs typeface="Arial" panose="020B0604020202020204" pitchFamily="34" charset="0"/>
-              </a:rPr>
-              <a:t>tbl_usuario</a:t>
-            </a:r>
-            <a:r>
-              <a:rPr lang="pt-BR" sz="2400" dirty="0">
-                <a:latin typeface="Arial" panose="020B0604020202020204" pitchFamily="34" charset="0"/>
-                <a:cs typeface="Arial" panose="020B0604020202020204" pitchFamily="34" charset="0"/>
-              </a:rPr>
-              <a:t>;</a:t>
-            </a:r>
-          </a:p>
-          <a:p>
-            <a:r>
-              <a:rPr lang="pt-BR" sz="2400" dirty="0">
-                <a:latin typeface="Arial" panose="020B0604020202020204" pitchFamily="34" charset="0"/>
-                <a:cs typeface="Arial" panose="020B0604020202020204" pitchFamily="34" charset="0"/>
-              </a:rPr>
-              <a:t>que servem </a:t>
-            </a:r>
-            <a:r>
-              <a:rPr lang="pt-BR" dirty="0">
-                <a:latin typeface="Arial" panose="020B0604020202020204" pitchFamily="34" charset="0"/>
-                <a:cs typeface="Arial" panose="020B0604020202020204" pitchFamily="34" charset="0"/>
-              </a:rPr>
-              <a:t>para armazenar os dados cadastrados no sistema</a:t>
-            </a:r>
-            <a:r>
-              <a:rPr lang="pt-BR" sz="2400" dirty="0">
-                <a:latin typeface="Arial" panose="020B0604020202020204" pitchFamily="34" charset="0"/>
-                <a:cs typeface="Arial" panose="020B0604020202020204" pitchFamily="34" charset="0"/>
-              </a:rPr>
-              <a:t>.</a:t>
+              <a:t> ,e foram utilizados os paradigmas de orientação a objetos.</a:t>
             </a:r>
           </a:p>
         </p:txBody>
@@ -6690,23 +6571,7 @@
           <a:p>
             <a:r>
               <a:rPr lang="pt-BR" dirty="0"/>
-              <a:t>O Sistema de locação de vídeo, </a:t>
-            </a:r>
-            <a:r>
-              <a:rPr lang="pt-BR" dirty="0" err="1"/>
-              <a:t>loopInfinito</a:t>
-            </a:r>
-            <a:r>
-              <a:rPr lang="pt-BR" dirty="0"/>
-              <a:t>, tem conexão com um banco de dados local chamado </a:t>
-            </a:r>
-            <a:r>
-              <a:rPr lang="pt-BR" dirty="0" err="1"/>
-              <a:t>bdlocadoraloop</a:t>
-            </a:r>
-            <a:r>
-              <a:rPr lang="pt-BR" dirty="0"/>
-              <a:t>, onde todas as informações passadas pelo usuário ficam contidas, e utiliza o XAMPP para realizar esta conexão, o sistema dispõe de uma interface bem agradável e fácil de utilizar.  </a:t>
+              <a:t>O Sistema de locação de vídeo, loopInfinito, tem conexão com um banco de dados local chamado bdlocadoraloop, onde todas as informações passadas pelo usuário ficam contidas, e utiliza o XAMPP para realizar esta conexão, o sistema dispõe de uma interface bem agradável e fácil de utilizar.  </a:t>
             </a:r>
           </a:p>
         </p:txBody>
@@ -6795,12 +6660,12 @@
         <p:spPr>
           <a:xfrm>
             <a:off x="1427954" y="2211641"/>
-            <a:ext cx="10131425" cy="3649133"/>
+            <a:ext cx="10131425" cy="4236293"/>
           </a:xfrm>
         </p:spPr>
         <p:txBody>
           <a:bodyPr>
-            <a:normAutofit fontScale="92500"/>
+            <a:normAutofit fontScale="92500" lnSpcReduction="10000"/>
           </a:bodyPr>
           <a:lstStyle/>
           <a:p>
@@ -6848,11 +6713,31 @@
                 <a:latin typeface="Arial" panose="020B0604020202020204" pitchFamily="34" charset="0"/>
                 <a:cs typeface="Arial" panose="020B0604020202020204" pitchFamily="34" charset="0"/>
               </a:rPr>
-              <a:t>Cliente</a:t>
+              <a:t>Sair</a:t>
             </a:r>
           </a:p>
           <a:p>
             <a:pPr lvl="1"/>
+            <a:r>
+              <a:rPr lang="pt-BR" dirty="0">
+                <a:latin typeface="Arial" panose="020B0604020202020204" pitchFamily="34" charset="0"/>
+                <a:cs typeface="Arial" panose="020B0604020202020204" pitchFamily="34" charset="0"/>
+              </a:rPr>
+              <a:t>Cadastros</a:t>
+            </a:r>
+          </a:p>
+          <a:p>
+            <a:pPr lvl="2"/>
+            <a:r>
+              <a:rPr lang="pt-BR" dirty="0">
+                <a:latin typeface="Arial" panose="020B0604020202020204" pitchFamily="34" charset="0"/>
+                <a:cs typeface="Arial" panose="020B0604020202020204" pitchFamily="34" charset="0"/>
+              </a:rPr>
+              <a:t>Clientes</a:t>
+            </a:r>
+          </a:p>
+          <a:p>
+            <a:pPr lvl="2"/>
             <a:r>
               <a:rPr lang="pt-BR" dirty="0">
                 <a:latin typeface="Arial" panose="020B0604020202020204" pitchFamily="34" charset="0"/>
@@ -6862,13 +6747,13 @@
             </a:r>
           </a:p>
           <a:p>
-            <a:pPr lvl="1"/>
+            <a:pPr lvl="2"/>
             <a:r>
               <a:rPr lang="pt-BR" dirty="0">
                 <a:latin typeface="Arial" panose="020B0604020202020204" pitchFamily="34" charset="0"/>
                 <a:cs typeface="Arial" panose="020B0604020202020204" pitchFamily="34" charset="0"/>
               </a:rPr>
-              <a:t>Usuário</a:t>
+              <a:t>Usuários</a:t>
             </a:r>
           </a:p>
           <a:p>
@@ -6878,7 +6763,7 @@
                 <a:latin typeface="Arial" panose="020B0604020202020204" pitchFamily="34" charset="0"/>
                 <a:cs typeface="Arial" panose="020B0604020202020204" pitchFamily="34" charset="0"/>
               </a:rPr>
-              <a:t>Sair</a:t>
+              <a:t>Locações</a:t>
             </a:r>
           </a:p>
           <a:p>
@@ -7097,7 +6982,7 @@
                 <a:latin typeface="Arial" panose="020B0604020202020204" pitchFamily="34" charset="0"/>
                 <a:cs typeface="Arial" panose="020B0604020202020204" pitchFamily="34" charset="0"/>
               </a:rPr>
-              <a:t>Na tela de cliente também há os botões cancelar, excluir, alterar, novo e salvar. Após qualquer alteração os dados são enviados para o banco de dados de clientes.</a:t>
+              <a:t>Na tela de cliente também há os botões cancelar, excluir, alterar, novo e salvar. Após qualquer alteração os dados são enviados para o banco e contidos na tabela cliente.</a:t>
             </a:r>
           </a:p>
           <a:p>
@@ -7220,7 +7105,7 @@
                 <a:latin typeface="Arial" panose="020B0604020202020204" pitchFamily="34" charset="0"/>
                 <a:cs typeface="Arial" panose="020B0604020202020204" pitchFamily="34" charset="0"/>
               </a:rPr>
-              <a:t>Cadastro, com as informações necessárias:</a:t>
+              <a:t>Cadastro é feito com as informações necessárias:</a:t>
             </a:r>
           </a:p>
           <a:p>
@@ -7380,7 +7265,7 @@
                 <a:latin typeface="Arial" panose="020B0604020202020204" pitchFamily="34" charset="0"/>
                 <a:cs typeface="Arial" panose="020B0604020202020204" pitchFamily="34" charset="0"/>
               </a:rPr>
-              <a:t>Pesquisa, onde se pode buscar por um filme que se queira.</a:t>
+              <a:t>Temos o campo Pesquisa, onde pode-se buscar um filme pelo título.</a:t>
             </a:r>
           </a:p>
           <a:p>
@@ -7390,31 +7275,7 @@
                 <a:latin typeface="Arial" panose="020B0604020202020204" pitchFamily="34" charset="0"/>
                 <a:cs typeface="Arial" panose="020B0604020202020204" pitchFamily="34" charset="0"/>
               </a:rPr>
-              <a:t>Nessa tela também há uma caixa de </a:t>
-            </a:r>
-            <a:r>
-              <a:rPr lang="pt-BR" sz="2400" dirty="0" err="1">
-                <a:latin typeface="Arial" panose="020B0604020202020204" pitchFamily="34" charset="0"/>
-                <a:cs typeface="Arial" panose="020B0604020202020204" pitchFamily="34" charset="0"/>
-              </a:rPr>
-              <a:t>de</a:t>
-            </a:r>
-            <a:r>
-              <a:rPr lang="pt-BR" sz="2400" dirty="0">
-                <a:latin typeface="Arial" panose="020B0604020202020204" pitchFamily="34" charset="0"/>
-                <a:cs typeface="Arial" panose="020B0604020202020204" pitchFamily="34" charset="0"/>
-              </a:rPr>
-              <a:t> estados para definir o gênero do filme que se busca;</a:t>
-            </a:r>
-          </a:p>
-          <a:p>
-            <a:pPr lvl="2"/>
-            <a:r>
-              <a:rPr lang="pt-BR" sz="2400" dirty="0">
-                <a:latin typeface="Arial" panose="020B0604020202020204" pitchFamily="34" charset="0"/>
-                <a:cs typeface="Arial" panose="020B0604020202020204" pitchFamily="34" charset="0"/>
-              </a:rPr>
-              <a:t>Há também uma lista que mostra todos os filmes cadastrados;</a:t>
+              <a:t>Uma tabela que mostra todos os filmes cadastrados;</a:t>
             </a:r>
           </a:p>
           <a:p>
@@ -7434,7 +7295,7 @@
                 <a:latin typeface="Arial" panose="020B0604020202020204" pitchFamily="34" charset="0"/>
                 <a:cs typeface="Arial" panose="020B0604020202020204" pitchFamily="34" charset="0"/>
               </a:rPr>
-              <a:t>Aqui as alterações são salvas no banco de dados de filmes.</a:t>
+              <a:t>Aqui as alterações são salvas na tabela de filmes do banco de dados.</a:t>
             </a:r>
           </a:p>
         </p:txBody>
@@ -7533,21 +7394,7 @@
                 <a:latin typeface="Arial" panose="020B0604020202020204" pitchFamily="34" charset="0"/>
                 <a:cs typeface="Arial" panose="020B0604020202020204" pitchFamily="34" charset="0"/>
               </a:rPr>
-              <a:t>Usuários, direciona para uma tela de cadastro de um novo usuário no sistema, </a:t>
-            </a:r>
-            <a:r>
-              <a:rPr lang="pt-BR" dirty="0" err="1">
-                <a:latin typeface="Arial" panose="020B0604020202020204" pitchFamily="34" charset="0"/>
-                <a:cs typeface="Arial" panose="020B0604020202020204" pitchFamily="34" charset="0"/>
-              </a:rPr>
-              <a:t>contedo</a:t>
-            </a:r>
-            <a:r>
-              <a:rPr lang="pt-BR" dirty="0">
-                <a:latin typeface="Arial" panose="020B0604020202020204" pitchFamily="34" charset="0"/>
-                <a:cs typeface="Arial" panose="020B0604020202020204" pitchFamily="34" charset="0"/>
-              </a:rPr>
-              <a:t> os campos:</a:t>
+              <a:t>Usuários, direciona para uma tela de cadastro de um novo usuário no sistema, contendo os campos:</a:t>
             </a:r>
           </a:p>
           <a:p>
@@ -7586,7 +7433,7 @@
                 <a:latin typeface="Arial" panose="020B0604020202020204" pitchFamily="34" charset="0"/>
                 <a:cs typeface="Arial" panose="020B0604020202020204" pitchFamily="34" charset="0"/>
               </a:rPr>
-              <a:t>Aqui também há uma lista que mostra todos os usuários cadastrados no sistema.</a:t>
+              <a:t>Aqui também há uma tabela que mostra todos os usuários cadastrados no sistema.</a:t>
             </a:r>
           </a:p>
           <a:p>
@@ -7604,7 +7451,7 @@
                 <a:latin typeface="Arial" panose="020B0604020202020204" pitchFamily="34" charset="0"/>
                 <a:cs typeface="Arial" panose="020B0604020202020204" pitchFamily="34" charset="0"/>
               </a:rPr>
-              <a:t>As alterações são salvas no banco de dados de usuários. </a:t>
+              <a:t>As alterações são salvas no banco de dados na tabela usuários. </a:t>
             </a:r>
           </a:p>
         </p:txBody>
@@ -7692,8 +7539,8 @@
         </p:nvSpPr>
         <p:spPr>
           <a:xfrm>
-            <a:off x="1371599" y="1562099"/>
-            <a:ext cx="10131425" cy="3649133"/>
+            <a:off x="1197205" y="1562099"/>
+            <a:ext cx="10305820" cy="3649133"/>
           </a:xfrm>
         </p:spPr>
         <p:txBody>
@@ -7721,7 +7568,7 @@
                 <a:latin typeface="Arial" panose="020B0604020202020204" pitchFamily="34" charset="0"/>
                 <a:cs typeface="Arial" panose="020B0604020202020204" pitchFamily="34" charset="0"/>
               </a:rPr>
-              <a:t>implementar a parte do sistema de locação, devido a isso o sistema não está completo, porém as poucas funções apresentadas no software funcionam de devida maneira. </a:t>
+              <a:t>implementar a parte do sistema de locação, e tratar a entrada de dados nos campos. Desta forma o sistema não está completo, porém as poucas funções apresentadas no software funcionam. </a:t>
             </a:r>
           </a:p>
         </p:txBody>
@@ -7774,7 +7621,7 @@
         </p:nvSpPr>
         <p:spPr>
           <a:xfrm>
-            <a:off x="2735147" y="0"/>
+            <a:off x="2867122" y="-443060"/>
             <a:ext cx="5043879" cy="1456267"/>
           </a:xfrm>
         </p:spPr>
@@ -7797,10 +7644,10 @@
       </p:sp>
       <p:pic>
         <p:nvPicPr>
-          <p:cNvPr id="15" name="Espaço Reservado para Conteúdo 14">
+          <p:cNvPr id="6" name="Espaço Reservado para Conteúdo 5">
             <a:extLst>
               <a:ext uri="{FF2B5EF4-FFF2-40B4-BE49-F238E27FC236}">
-                <a16:creationId xmlns:a16="http://schemas.microsoft.com/office/drawing/2014/main" id="{DE4ADB4E-D84E-4E78-A46B-D104A7119021}"/>
+                <a16:creationId xmlns:a16="http://schemas.microsoft.com/office/drawing/2014/main" id="{84ADB114-44F1-4092-BBF9-A8192DE1EC4F}"/>
               </a:ext>
             </a:extLst>
           </p:cNvPr>
@@ -7819,12 +7666,9 @@
         </p:blipFill>
         <p:spPr>
           <a:xfrm>
-            <a:off x="3424363" y="1090063"/>
-            <a:ext cx="5343274" cy="5284233"/>
+            <a:off x="1190192" y="499621"/>
+            <a:ext cx="9811615" cy="6232495"/>
           </a:xfrm>
-          <a:prstGeom prst="rect">
-            <a:avLst/>
-          </a:prstGeom>
         </p:spPr>
       </p:pic>
     </p:spTree>

</xml_diff>